<commit_message>
Add notes from class
</commit_message>
<xml_diff>
--- a/ClassMaterials/Week6/Programmatic AI.pptx
+++ b/ClassMaterials/Week6/Programmatic AI.pptx
@@ -5,7 +5,7 @@
     <p:sldMasterId id="2147483648" r:id="rId1"/>
   </p:sldMasterIdLst>
   <p:notesMasterIdLst>
-    <p:notesMasterId r:id="rId19"/>
+    <p:notesMasterId r:id="rId22"/>
   </p:notesMasterIdLst>
   <p:sldIdLst>
     <p:sldId id="256" r:id="rId2"/>
@@ -19,12 +19,15 @@
     <p:sldId id="293" r:id="rId10"/>
     <p:sldId id="273" r:id="rId11"/>
     <p:sldId id="288" r:id="rId12"/>
-    <p:sldId id="261" r:id="rId13"/>
-    <p:sldId id="286" r:id="rId14"/>
-    <p:sldId id="287" r:id="rId15"/>
-    <p:sldId id="289" r:id="rId16"/>
-    <p:sldId id="290" r:id="rId17"/>
-    <p:sldId id="291" r:id="rId18"/>
+    <p:sldId id="295" r:id="rId13"/>
+    <p:sldId id="296" r:id="rId14"/>
+    <p:sldId id="297" r:id="rId15"/>
+    <p:sldId id="286" r:id="rId16"/>
+    <p:sldId id="287" r:id="rId17"/>
+    <p:sldId id="289" r:id="rId18"/>
+    <p:sldId id="290" r:id="rId19"/>
+    <p:sldId id="261" r:id="rId20"/>
+    <p:sldId id="291" r:id="rId21"/>
   </p:sldIdLst>
   <p:sldSz cx="12192000" cy="6858000"/>
   <p:notesSz cx="6858000" cy="9144000"/>
@@ -213,7 +216,7 @@
           <a:p>
             <a:fld id="{5772895F-5AD4-4F3D-9C62-4330216F256A}" type="datetimeFigureOut">
               <a:rPr lang="en-US" smtClean="0"/>
-              <a:t>10/14/25</a:t>
+              <a:t>10/15/25</a:t>
             </a:fld>
             <a:endParaRPr lang="en-US"/>
           </a:p>
@@ -524,6 +527,52 @@
           <a:bodyPr/>
           <a:lstStyle/>
           <a:p>
+            <a:pPr marL="0" marR="0" lvl="0" indent="0" algn="l" defTabSz="914400" rtl="0" eaLnBrk="1" fontAlgn="auto" latinLnBrk="0" hangingPunct="1">
+              <a:lnSpc>
+                <a:spcPct val="100000"/>
+              </a:lnSpc>
+              <a:spcBef>
+                <a:spcPts val="0"/>
+              </a:spcBef>
+              <a:spcAft>
+                <a:spcPts val="0"/>
+              </a:spcAft>
+              <a:buClrTx/>
+              <a:buSzTx/>
+              <a:buFontTx/>
+              <a:buNone/>
+              <a:tabLst/>
+              <a:defRPr/>
+            </a:pPr>
+            <a:r>
+              <a:rPr lang="en-US" dirty="0"/>
+              <a:t>Give it examples.</a:t>
+            </a:r>
+          </a:p>
+          <a:p>
+            <a:pPr marL="0" marR="0" lvl="0" indent="0" algn="l" defTabSz="914400" rtl="0" eaLnBrk="1" fontAlgn="auto" latinLnBrk="0" hangingPunct="1">
+              <a:lnSpc>
+                <a:spcPct val="100000"/>
+              </a:lnSpc>
+              <a:spcBef>
+                <a:spcPts val="0"/>
+              </a:spcBef>
+              <a:spcAft>
+                <a:spcPts val="0"/>
+              </a:spcAft>
+              <a:buClrTx/>
+              <a:buSzTx/>
+              <a:buFontTx/>
+              <a:buNone/>
+              <a:tabLst/>
+              <a:defRPr/>
+            </a:pPr>
+            <a:r>
+              <a:rPr lang="en-US" dirty="0"/>
+              <a:t>If the response is free-form or complicated, you can make a second call to the LLM, asking it to parse the response.</a:t>
+            </a:r>
+          </a:p>
+          <a:p>
             <a:endParaRPr lang="en-US" dirty="0"/>
           </a:p>
         </p:txBody>
@@ -545,7 +594,7 @@
           <a:p>
             <a:fld id="{89DD2ADE-AB50-4586-8D7B-BE0282063055}" type="slidenum">
               <a:rPr lang="en-US" smtClean="0"/>
-              <a:t>12</a:t>
+              <a:t>18</a:t>
             </a:fld>
             <a:endParaRPr lang="en-US"/>
           </a:p>
@@ -554,7 +603,7 @@
     </p:spTree>
     <p:extLst>
       <p:ext uri="{BB962C8B-B14F-4D97-AF65-F5344CB8AC3E}">
-        <p14:creationId xmlns:p14="http://schemas.microsoft.com/office/powerpoint/2010/main" val="2200617975"/>
+        <p14:creationId xmlns:p14="http://schemas.microsoft.com/office/powerpoint/2010/main" val="3675466293"/>
       </p:ext>
     </p:extLst>
   </p:cSld>
@@ -608,52 +657,6 @@
           <a:bodyPr/>
           <a:lstStyle/>
           <a:p>
-            <a:pPr marL="0" marR="0" lvl="0" indent="0" algn="l" defTabSz="914400" rtl="0" eaLnBrk="1" fontAlgn="auto" latinLnBrk="0" hangingPunct="1">
-              <a:lnSpc>
-                <a:spcPct val="100000"/>
-              </a:lnSpc>
-              <a:spcBef>
-                <a:spcPts val="0"/>
-              </a:spcBef>
-              <a:spcAft>
-                <a:spcPts val="0"/>
-              </a:spcAft>
-              <a:buClrTx/>
-              <a:buSzTx/>
-              <a:buFontTx/>
-              <a:buNone/>
-              <a:tabLst/>
-              <a:defRPr/>
-            </a:pPr>
-            <a:r>
-              <a:rPr lang="en-US" dirty="0"/>
-              <a:t>Give it examples.</a:t>
-            </a:r>
-          </a:p>
-          <a:p>
-            <a:pPr marL="0" marR="0" lvl="0" indent="0" algn="l" defTabSz="914400" rtl="0" eaLnBrk="1" fontAlgn="auto" latinLnBrk="0" hangingPunct="1">
-              <a:lnSpc>
-                <a:spcPct val="100000"/>
-              </a:lnSpc>
-              <a:spcBef>
-                <a:spcPts val="0"/>
-              </a:spcBef>
-              <a:spcAft>
-                <a:spcPts val="0"/>
-              </a:spcAft>
-              <a:buClrTx/>
-              <a:buSzTx/>
-              <a:buFontTx/>
-              <a:buNone/>
-              <a:tabLst/>
-              <a:defRPr/>
-            </a:pPr>
-            <a:r>
-              <a:rPr lang="en-US" dirty="0"/>
-              <a:t>If the response is free-form or complicated, you can make a second call to the LLM, asking it to parse the response.</a:t>
-            </a:r>
-          </a:p>
-          <a:p>
             <a:endParaRPr lang="en-US" dirty="0"/>
           </a:p>
         </p:txBody>
@@ -675,7 +678,7 @@
           <a:p>
             <a:fld id="{89DD2ADE-AB50-4586-8D7B-BE0282063055}" type="slidenum">
               <a:rPr lang="en-US" smtClean="0"/>
-              <a:t>16</a:t>
+              <a:t>19</a:t>
             </a:fld>
             <a:endParaRPr lang="en-US"/>
           </a:p>
@@ -684,7 +687,7 @@
     </p:spTree>
     <p:extLst>
       <p:ext uri="{BB962C8B-B14F-4D97-AF65-F5344CB8AC3E}">
-        <p14:creationId xmlns:p14="http://schemas.microsoft.com/office/powerpoint/2010/main" val="3675466293"/>
+        <p14:creationId xmlns:p14="http://schemas.microsoft.com/office/powerpoint/2010/main" val="2200617975"/>
       </p:ext>
     </p:extLst>
   </p:cSld>
@@ -841,7 +844,7 @@
           <a:p>
             <a:fld id="{0BEE2EE8-644E-438E-A24D-F2C140D42D65}" type="datetimeFigureOut">
               <a:rPr lang="en-US" smtClean="0"/>
-              <a:t>10/14/25</a:t>
+              <a:t>10/15/25</a:t>
             </a:fld>
             <a:endParaRPr lang="en-US"/>
           </a:p>
@@ -1039,7 +1042,7 @@
           <a:p>
             <a:fld id="{0BEE2EE8-644E-438E-A24D-F2C140D42D65}" type="datetimeFigureOut">
               <a:rPr lang="en-US" smtClean="0"/>
-              <a:t>10/14/25</a:t>
+              <a:t>10/15/25</a:t>
             </a:fld>
             <a:endParaRPr lang="en-US"/>
           </a:p>
@@ -1247,7 +1250,7 @@
           <a:p>
             <a:fld id="{0BEE2EE8-644E-438E-A24D-F2C140D42D65}" type="datetimeFigureOut">
               <a:rPr lang="en-US" smtClean="0"/>
-              <a:t>10/14/25</a:t>
+              <a:t>10/15/25</a:t>
             </a:fld>
             <a:endParaRPr lang="en-US"/>
           </a:p>
@@ -1445,7 +1448,7 @@
           <a:p>
             <a:fld id="{0BEE2EE8-644E-438E-A24D-F2C140D42D65}" type="datetimeFigureOut">
               <a:rPr lang="en-US" smtClean="0"/>
-              <a:t>10/14/25</a:t>
+              <a:t>10/15/25</a:t>
             </a:fld>
             <a:endParaRPr lang="en-US"/>
           </a:p>
@@ -1720,7 +1723,7 @@
           <a:p>
             <a:fld id="{0BEE2EE8-644E-438E-A24D-F2C140D42D65}" type="datetimeFigureOut">
               <a:rPr lang="en-US" smtClean="0"/>
-              <a:t>10/14/25</a:t>
+              <a:t>10/15/25</a:t>
             </a:fld>
             <a:endParaRPr lang="en-US"/>
           </a:p>
@@ -1985,7 +1988,7 @@
           <a:p>
             <a:fld id="{0BEE2EE8-644E-438E-A24D-F2C140D42D65}" type="datetimeFigureOut">
               <a:rPr lang="en-US" smtClean="0"/>
-              <a:t>10/14/25</a:t>
+              <a:t>10/15/25</a:t>
             </a:fld>
             <a:endParaRPr lang="en-US"/>
           </a:p>
@@ -2397,7 +2400,7 @@
           <a:p>
             <a:fld id="{0BEE2EE8-644E-438E-A24D-F2C140D42D65}" type="datetimeFigureOut">
               <a:rPr lang="en-US" smtClean="0"/>
-              <a:t>10/14/25</a:t>
+              <a:t>10/15/25</a:t>
             </a:fld>
             <a:endParaRPr lang="en-US"/>
           </a:p>
@@ -2538,7 +2541,7 @@
           <a:p>
             <a:fld id="{0BEE2EE8-644E-438E-A24D-F2C140D42D65}" type="datetimeFigureOut">
               <a:rPr lang="en-US" smtClean="0"/>
-              <a:t>10/14/25</a:t>
+              <a:t>10/15/25</a:t>
             </a:fld>
             <a:endParaRPr lang="en-US"/>
           </a:p>
@@ -2651,7 +2654,7 @@
           <a:p>
             <a:fld id="{0BEE2EE8-644E-438E-A24D-F2C140D42D65}" type="datetimeFigureOut">
               <a:rPr lang="en-US" smtClean="0"/>
-              <a:t>10/14/25</a:t>
+              <a:t>10/15/25</a:t>
             </a:fld>
             <a:endParaRPr lang="en-US"/>
           </a:p>
@@ -2962,7 +2965,7 @@
           <a:p>
             <a:fld id="{0BEE2EE8-644E-438E-A24D-F2C140D42D65}" type="datetimeFigureOut">
               <a:rPr lang="en-US" smtClean="0"/>
-              <a:t>10/14/25</a:t>
+              <a:t>10/15/25</a:t>
             </a:fld>
             <a:endParaRPr lang="en-US"/>
           </a:p>
@@ -3250,7 +3253,7 @@
           <a:p>
             <a:fld id="{0BEE2EE8-644E-438E-A24D-F2C140D42D65}" type="datetimeFigureOut">
               <a:rPr lang="en-US" smtClean="0"/>
-              <a:t>10/14/25</a:t>
+              <a:t>10/15/25</a:t>
             </a:fld>
             <a:endParaRPr lang="en-US"/>
           </a:p>
@@ -3491,7 +3494,7 @@
           <a:p>
             <a:fld id="{0BEE2EE8-644E-438E-A24D-F2C140D42D65}" type="datetimeFigureOut">
               <a:rPr lang="en-US" smtClean="0"/>
-              <a:t>10/14/25</a:t>
+              <a:t>10/15/25</a:t>
             </a:fld>
             <a:endParaRPr lang="en-US"/>
           </a:p>
@@ -4630,7 +4633,7 @@
           <p:cNvPr id="2" name="Title 1">
             <a:extLst>
               <a:ext uri="{FF2B5EF4-FFF2-40B4-BE49-F238E27FC236}">
-                <a16:creationId xmlns:a16="http://schemas.microsoft.com/office/drawing/2014/main" id="{149F1303-F8A9-BCE5-6A26-8805F72C66B0}"/>
+                <a16:creationId xmlns:a16="http://schemas.microsoft.com/office/drawing/2014/main" id="{36CE5191-E8CA-9384-9533-204803E00685}"/>
               </a:ext>
             </a:extLst>
           </p:cNvPr>
@@ -4646,27 +4649,30 @@
           <a:bodyPr/>
           <a:lstStyle/>
           <a:p>
-            <a:r>
+            <a:br>
               <a:rPr lang="en-US" dirty="0"/>
-              <a:t>API</a:t>
-            </a:r>
-          </a:p>
-        </p:txBody>
-      </p:sp>
-      <p:sp>
-        <p:nvSpPr>
-          <p:cNvPr id="3" name="Content Placeholder 2">
-            <a:extLst>
-              <a:ext uri="{FF2B5EF4-FFF2-40B4-BE49-F238E27FC236}">
-                <a16:creationId xmlns:a16="http://schemas.microsoft.com/office/drawing/2014/main" id="{4C971840-A014-B67C-8448-0E6A96B2C2F6}"/>
-              </a:ext>
-            </a:extLst>
-          </p:cNvPr>
-          <p:cNvSpPr>
-            <a:spLocks noGrp="1"/>
-          </p:cNvSpPr>
-          <p:nvPr>
-            <p:ph idx="1"/>
+            </a:br>
+            <a:r>
+              <a:rPr lang="en-US" dirty="0"/>
+              <a:t>Each API call you make is “fresh”.</a:t>
+            </a:r>
+          </a:p>
+        </p:txBody>
+      </p:sp>
+      <p:sp>
+        <p:nvSpPr>
+          <p:cNvPr id="4" name="Text Placeholder 3">
+            <a:extLst>
+              <a:ext uri="{FF2B5EF4-FFF2-40B4-BE49-F238E27FC236}">
+                <a16:creationId xmlns:a16="http://schemas.microsoft.com/office/drawing/2014/main" id="{AB13C67F-DE16-4855-7471-65A64B76325B}"/>
+              </a:ext>
+            </a:extLst>
+          </p:cNvPr>
+          <p:cNvSpPr>
+            <a:spLocks noGrp="1"/>
+          </p:cNvSpPr>
+          <p:nvPr>
+            <p:ph type="body" idx="1"/>
           </p:nvPr>
         </p:nvSpPr>
         <p:spPr/>
@@ -4676,33 +4682,29 @@
           <a:p>
             <a:r>
               <a:rPr lang="en-US" dirty="0">
-                <a:hlinkClick r:id="rId3"/>
+                <a:solidFill>
+                  <a:schemeClr val="tx1"/>
+                </a:solidFill>
               </a:rPr>
-              <a:t>https://platform.openai.com/docs/api-reference/chat/get</a:t>
-            </a:r>
-            <a:r>
-              <a:rPr lang="en-US" dirty="0"/>
-              <a:t> </a:t>
-            </a:r>
-          </a:p>
-          <a:p>
-            <a:endParaRPr lang="en-US" dirty="0"/>
-          </a:p>
-          <a:p>
-            <a:r>
-              <a:rPr lang="en-US" dirty="0"/>
-              <a:t>Of course they are pushing the latest version of the model. You won’t need that here.</a:t>
-            </a:r>
-          </a:p>
-          <a:p>
-            <a:endParaRPr lang="en-US" dirty="0"/>
+              <a:t>The LLM doesn’t store your history of calls.</a:t>
+            </a:r>
+          </a:p>
+          <a:p>
+            <a:r>
+              <a:rPr lang="en-US" dirty="0">
+                <a:solidFill>
+                  <a:schemeClr val="tx1"/>
+                </a:solidFill>
+              </a:rPr>
+              <a:t>If you want history, track it yourself.</a:t>
+            </a:r>
           </a:p>
         </p:txBody>
       </p:sp>
     </p:spTree>
     <p:extLst>
       <p:ext uri="{BB962C8B-B14F-4D97-AF65-F5344CB8AC3E}">
-        <p14:creationId xmlns:p14="http://schemas.microsoft.com/office/powerpoint/2010/main" val="2442557687"/>
+        <p14:creationId xmlns:p14="http://schemas.microsoft.com/office/powerpoint/2010/main" val="3727863674"/>
       </p:ext>
     </p:extLst>
   </p:cSld>
@@ -4734,7 +4736,7 @@
           <p:cNvPr id="2" name="Title 1">
             <a:extLst>
               <a:ext uri="{FF2B5EF4-FFF2-40B4-BE49-F238E27FC236}">
-                <a16:creationId xmlns:a16="http://schemas.microsoft.com/office/drawing/2014/main" id="{BEBF70BC-13C0-4E46-0469-4ED75D1CD6E7}"/>
+                <a16:creationId xmlns:a16="http://schemas.microsoft.com/office/drawing/2014/main" id="{36CE5191-E8CA-9384-9533-204803E00685}"/>
               </a:ext>
             </a:extLst>
           </p:cNvPr>
@@ -4750,9 +4752,12 @@
           <a:bodyPr/>
           <a:lstStyle/>
           <a:p>
-            <a:r>
+            <a:br>
               <a:rPr lang="en-US" dirty="0"/>
-              <a:t>Demo of the completed app</a:t>
+            </a:br>
+            <a:r>
+              <a:rPr lang="en-US" dirty="0"/>
+              <a:t>Each API call you make is “fresh”.</a:t>
             </a:r>
           </a:p>
         </p:txBody>
@@ -4762,7 +4767,7 @@
           <p:cNvPr id="4" name="Text Placeholder 3">
             <a:extLst>
               <a:ext uri="{FF2B5EF4-FFF2-40B4-BE49-F238E27FC236}">
-                <a16:creationId xmlns:a16="http://schemas.microsoft.com/office/drawing/2014/main" id="{44B02EB6-2963-04BF-D0D2-7FBF0BB1C1DA}"/>
+                <a16:creationId xmlns:a16="http://schemas.microsoft.com/office/drawing/2014/main" id="{AB13C67F-DE16-4855-7471-65A64B76325B}"/>
               </a:ext>
             </a:extLst>
           </p:cNvPr>
@@ -4779,8 +4784,22 @@
           <a:lstStyle/>
           <a:p>
             <a:r>
-              <a:rPr lang="en-US" dirty="0"/>
-              <a:t>How well does it work?</a:t>
+              <a:rPr lang="en-US" dirty="0">
+                <a:solidFill>
+                  <a:schemeClr val="tx1"/>
+                </a:solidFill>
+              </a:rPr>
+              <a:t>The LLM doesn’t store your history of calls.</a:t>
+            </a:r>
+          </a:p>
+          <a:p>
+            <a:r>
+              <a:rPr lang="en-US" dirty="0">
+                <a:solidFill>
+                  <a:schemeClr val="tx1"/>
+                </a:solidFill>
+              </a:rPr>
+              <a:t>If you want history, track it yourself.</a:t>
             </a:r>
           </a:p>
         </p:txBody>
@@ -4788,7 +4807,7 @@
     </p:spTree>
     <p:extLst>
       <p:ext uri="{BB962C8B-B14F-4D97-AF65-F5344CB8AC3E}">
-        <p14:creationId xmlns:p14="http://schemas.microsoft.com/office/powerpoint/2010/main" val="2042611052"/>
+        <p14:creationId xmlns:p14="http://schemas.microsoft.com/office/powerpoint/2010/main" val="2826552609"/>
       </p:ext>
     </p:extLst>
   </p:cSld>
@@ -4820,7 +4839,7 @@
           <p:cNvPr id="2" name="Title 1">
             <a:extLst>
               <a:ext uri="{FF2B5EF4-FFF2-40B4-BE49-F238E27FC236}">
-                <a16:creationId xmlns:a16="http://schemas.microsoft.com/office/drawing/2014/main" id="{4057DBD0-32F0-0FF1-A1CC-79FB6885BD79}"/>
+                <a16:creationId xmlns:a16="http://schemas.microsoft.com/office/drawing/2014/main" id="{36CE5191-E8CA-9384-9533-204803E00685}"/>
               </a:ext>
             </a:extLst>
           </p:cNvPr>
@@ -4838,25 +4857,25 @@
           <a:p>
             <a:r>
               <a:rPr lang="en-US" dirty="0"/>
-              <a:t>Your job…</a:t>
-            </a:r>
-          </a:p>
-        </p:txBody>
-      </p:sp>
-      <p:sp>
-        <p:nvSpPr>
-          <p:cNvPr id="3" name="Content Placeholder 2">
-            <a:extLst>
-              <a:ext uri="{FF2B5EF4-FFF2-40B4-BE49-F238E27FC236}">
-                <a16:creationId xmlns:a16="http://schemas.microsoft.com/office/drawing/2014/main" id="{CFF387D0-8C86-9A4D-D207-D40BEC7C372E}"/>
-              </a:ext>
-            </a:extLst>
-          </p:cNvPr>
-          <p:cNvSpPr>
-            <a:spLocks noGrp="1"/>
-          </p:cNvSpPr>
-          <p:nvPr>
-            <p:ph idx="1"/>
+              <a:t>One size fits all? NOT!</a:t>
+            </a:r>
+          </a:p>
+        </p:txBody>
+      </p:sp>
+      <p:sp>
+        <p:nvSpPr>
+          <p:cNvPr id="4" name="Text Placeholder 3">
+            <a:extLst>
+              <a:ext uri="{FF2B5EF4-FFF2-40B4-BE49-F238E27FC236}">
+                <a16:creationId xmlns:a16="http://schemas.microsoft.com/office/drawing/2014/main" id="{AB13C67F-DE16-4855-7471-65A64B76325B}"/>
+              </a:ext>
+            </a:extLst>
+          </p:cNvPr>
+          <p:cNvSpPr>
+            <a:spLocks noGrp="1"/>
+          </p:cNvSpPr>
+          <p:nvPr>
+            <p:ph type="body" idx="1"/>
           </p:nvPr>
         </p:nvSpPr>
         <p:spPr/>
@@ -4865,31 +4884,52 @@
           <a:lstStyle/>
           <a:p>
             <a:r>
-              <a:rPr lang="en-US" dirty="0"/>
-              <a:t>Write the prompt. Figure out if you need to tweak it for better results.</a:t>
-            </a:r>
-          </a:p>
-          <a:p>
-            <a:r>
-              <a:rPr lang="en-US" dirty="0"/>
-              <a:t>Make the call.</a:t>
-            </a:r>
-          </a:p>
-          <a:p>
-            <a:r>
-              <a:rPr lang="en-US" dirty="0"/>
-              <a:t>Parse the response.</a:t>
-            </a:r>
-          </a:p>
-          <a:p>
-            <a:endParaRPr lang="en-US" dirty="0"/>
+              <a:rPr lang="en-US" dirty="0">
+                <a:solidFill>
+                  <a:schemeClr val="tx1"/>
+                </a:solidFill>
+              </a:rPr>
+              <a:t>A prompt that you tune to work one well on </a:t>
+            </a:r>
+            <a:r>
+              <a:rPr lang="en-US" dirty="0" err="1">
+                <a:solidFill>
+                  <a:schemeClr val="tx1"/>
+                </a:solidFill>
+              </a:rPr>
+              <a:t>OpenAI</a:t>
+            </a:r>
+            <a:r>
+              <a:rPr lang="en-US" dirty="0">
+                <a:solidFill>
+                  <a:schemeClr val="tx1"/>
+                </a:solidFill>
+              </a:rPr>
+              <a:t> GPT-4o-mini won’t necessarily be amazing on another LLM. How will you know </a:t>
+            </a:r>
+            <a:r>
+              <a:rPr lang="en-US">
+                <a:solidFill>
+                  <a:schemeClr val="tx1"/>
+                </a:solidFill>
+              </a:rPr>
+              <a:t>how well it </a:t>
+            </a:r>
+            <a:r>
+              <a:rPr lang="en-US" dirty="0">
+                <a:solidFill>
+                  <a:schemeClr val="tx1"/>
+                </a:solidFill>
+              </a:rPr>
+              <a:t>works?</a:t>
+            </a:r>
           </a:p>
         </p:txBody>
       </p:sp>
     </p:spTree>
     <p:extLst>
       <p:ext uri="{BB962C8B-B14F-4D97-AF65-F5344CB8AC3E}">
-        <p14:creationId xmlns:p14="http://schemas.microsoft.com/office/powerpoint/2010/main" val="928101851"/>
+        <p14:creationId xmlns:p14="http://schemas.microsoft.com/office/powerpoint/2010/main" val="3203773299"/>
       </p:ext>
     </p:extLst>
   </p:cSld>
@@ -4921,7 +4961,7 @@
           <p:cNvPr id="2" name="Title 1">
             <a:extLst>
               <a:ext uri="{FF2B5EF4-FFF2-40B4-BE49-F238E27FC236}">
-                <a16:creationId xmlns:a16="http://schemas.microsoft.com/office/drawing/2014/main" id="{974E0BA9-0B2D-E2E6-5AAB-A9ECF0A8CA58}"/>
+                <a16:creationId xmlns:a16="http://schemas.microsoft.com/office/drawing/2014/main" id="{BEBF70BC-13C0-4E46-0469-4ED75D1CD6E7}"/>
               </a:ext>
             </a:extLst>
           </p:cNvPr>
@@ -4939,25 +4979,25 @@
           <a:p>
             <a:r>
               <a:rPr lang="en-US" dirty="0"/>
-              <a:t>Extensions: Handling Big Files</a:t>
-            </a:r>
-          </a:p>
-        </p:txBody>
-      </p:sp>
-      <p:sp>
-        <p:nvSpPr>
-          <p:cNvPr id="3" name="Content Placeholder 2">
-            <a:extLst>
-              <a:ext uri="{FF2B5EF4-FFF2-40B4-BE49-F238E27FC236}">
-                <a16:creationId xmlns:a16="http://schemas.microsoft.com/office/drawing/2014/main" id="{B8934C0E-EC66-4522-3243-43AA772F1734}"/>
-              </a:ext>
-            </a:extLst>
-          </p:cNvPr>
-          <p:cNvSpPr>
-            <a:spLocks noGrp="1"/>
-          </p:cNvSpPr>
-          <p:nvPr>
-            <p:ph idx="1"/>
+              <a:t>Demo of the completed app</a:t>
+            </a:r>
+          </a:p>
+        </p:txBody>
+      </p:sp>
+      <p:sp>
+        <p:nvSpPr>
+          <p:cNvPr id="4" name="Text Placeholder 3">
+            <a:extLst>
+              <a:ext uri="{FF2B5EF4-FFF2-40B4-BE49-F238E27FC236}">
+                <a16:creationId xmlns:a16="http://schemas.microsoft.com/office/drawing/2014/main" id="{44B02EB6-2963-04BF-D0D2-7FBF0BB1C1DA}"/>
+              </a:ext>
+            </a:extLst>
+          </p:cNvPr>
+          <p:cNvSpPr>
+            <a:spLocks noGrp="1"/>
+          </p:cNvSpPr>
+          <p:nvPr>
+            <p:ph type="body" idx="1"/>
           </p:nvPr>
         </p:nvSpPr>
         <p:spPr/>
@@ -4967,19 +5007,7 @@
           <a:p>
             <a:r>
               <a:rPr lang="en-US" dirty="0"/>
-              <a:t>What if the .csv file that you need to ask the LLM questions about is 30,000 lines long?</a:t>
-            </a:r>
-          </a:p>
-          <a:p>
-            <a:r>
-              <a:rPr lang="en-US" dirty="0"/>
-              <a:t>Why is this a problem?</a:t>
-            </a:r>
-          </a:p>
-          <a:p>
-            <a:r>
-              <a:rPr lang="en-US" dirty="0"/>
-              <a:t>What should we do?</a:t>
+              <a:t>How well does it work?</a:t>
             </a:r>
           </a:p>
         </p:txBody>
@@ -4987,7 +5015,7 @@
     </p:spTree>
     <p:extLst>
       <p:ext uri="{BB962C8B-B14F-4D97-AF65-F5344CB8AC3E}">
-        <p14:creationId xmlns:p14="http://schemas.microsoft.com/office/powerpoint/2010/main" val="3870389778"/>
+        <p14:creationId xmlns:p14="http://schemas.microsoft.com/office/powerpoint/2010/main" val="2042611052"/>
       </p:ext>
     </p:extLst>
   </p:cSld>
@@ -5019,7 +5047,7 @@
           <p:cNvPr id="2" name="Title 1">
             <a:extLst>
               <a:ext uri="{FF2B5EF4-FFF2-40B4-BE49-F238E27FC236}">
-                <a16:creationId xmlns:a16="http://schemas.microsoft.com/office/drawing/2014/main" id="{974E0BA9-0B2D-E2E6-5AAB-A9ECF0A8CA58}"/>
+                <a16:creationId xmlns:a16="http://schemas.microsoft.com/office/drawing/2014/main" id="{4057DBD0-32F0-0FF1-A1CC-79FB6885BD79}"/>
               </a:ext>
             </a:extLst>
           </p:cNvPr>
@@ -5037,7 +5065,7 @@
           <a:p>
             <a:r>
               <a:rPr lang="en-US" dirty="0"/>
-              <a:t>Extensions: Parsing the Response</a:t>
+              <a:t>Your job…</a:t>
             </a:r>
           </a:p>
         </p:txBody>
@@ -5047,7 +5075,7 @@
           <p:cNvPr id="3" name="Content Placeholder 2">
             <a:extLst>
               <a:ext uri="{FF2B5EF4-FFF2-40B4-BE49-F238E27FC236}">
-                <a16:creationId xmlns:a16="http://schemas.microsoft.com/office/drawing/2014/main" id="{B8934C0E-EC66-4522-3243-43AA772F1734}"/>
+                <a16:creationId xmlns:a16="http://schemas.microsoft.com/office/drawing/2014/main" id="{CFF387D0-8C86-9A4D-D207-D40BEC7C372E}"/>
               </a:ext>
             </a:extLst>
           </p:cNvPr>
@@ -5065,21 +5093,30 @@
           <a:p>
             <a:r>
               <a:rPr lang="en-US" dirty="0"/>
-              <a:t>What if it is painful to parse the LLM’s response?</a:t>
+              <a:t>Write the prompt. Figure out if you need to tweak it for better results.</a:t>
             </a:r>
           </a:p>
           <a:p>
             <a:r>
               <a:rPr lang="en-US" dirty="0"/>
-              <a:t>Any ideas for what to do?</a:t>
-            </a:r>
+              <a:t>Make the call.</a:t>
+            </a:r>
+          </a:p>
+          <a:p>
+            <a:r>
+              <a:rPr lang="en-US" dirty="0"/>
+              <a:t>Parse the response.</a:t>
+            </a:r>
+          </a:p>
+          <a:p>
+            <a:endParaRPr lang="en-US" dirty="0"/>
           </a:p>
         </p:txBody>
       </p:sp>
     </p:spTree>
     <p:extLst>
       <p:ext uri="{BB962C8B-B14F-4D97-AF65-F5344CB8AC3E}">
-        <p14:creationId xmlns:p14="http://schemas.microsoft.com/office/powerpoint/2010/main" val="3514943817"/>
+        <p14:creationId xmlns:p14="http://schemas.microsoft.com/office/powerpoint/2010/main" val="928101851"/>
       </p:ext>
     </p:extLst>
   </p:cSld>
@@ -5129,7 +5166,7 @@
           <a:p>
             <a:r>
               <a:rPr lang="en-US" dirty="0"/>
-              <a:t>Extensions: Other APIs </a:t>
+              <a:t>Extensions: Handling Big Files</a:t>
             </a:r>
           </a:p>
         </p:txBody>
@@ -5156,27 +5193,20 @@
           <a:lstStyle/>
           <a:p>
             <a:r>
-              <a:rPr lang="en-US" dirty="0" err="1"/>
-              <a:t>Websearch</a:t>
-            </a:r>
-            <a:r>
               <a:rPr lang="en-US" dirty="0"/>
-              <a:t>: a responses tool.</a:t>
+              <a:t>What if the .csv file that you need to ask the LLM questions about is 30,000 lines long?</a:t>
             </a:r>
           </a:p>
           <a:p>
             <a:r>
               <a:rPr lang="en-US" dirty="0"/>
-              <a:t>Image: use as input to the call.</a:t>
-            </a:r>
-          </a:p>
-          <a:p>
-            <a:endParaRPr lang="en-US" dirty="0"/>
+              <a:t>Why is this a problem?</a:t>
+            </a:r>
           </a:p>
           <a:p>
             <a:r>
               <a:rPr lang="en-US" dirty="0"/>
-              <a:t>Back to the API for hooks.</a:t>
+              <a:t>What should we do?</a:t>
             </a:r>
           </a:p>
         </p:txBody>
@@ -5184,7 +5214,247 @@
     </p:spTree>
     <p:extLst>
       <p:ext uri="{BB962C8B-B14F-4D97-AF65-F5344CB8AC3E}">
-        <p14:creationId xmlns:p14="http://schemas.microsoft.com/office/powerpoint/2010/main" val="60481046"/>
+        <p14:creationId xmlns:p14="http://schemas.microsoft.com/office/powerpoint/2010/main" val="3870389778"/>
+      </p:ext>
+    </p:extLst>
+  </p:cSld>
+  <p:clrMapOvr>
+    <a:masterClrMapping/>
+  </p:clrMapOvr>
+</p:sld>
+</file>
+
+<file path=ppt/slides/slide18.xml><?xml version="1.0" encoding="utf-8"?>
+<p:sld xmlns:a="http://schemas.openxmlformats.org/drawingml/2006/main" xmlns:r="http://schemas.openxmlformats.org/officeDocument/2006/relationships" xmlns:p="http://schemas.openxmlformats.org/presentationml/2006/main">
+  <p:cSld>
+    <p:spTree>
+      <p:nvGrpSpPr>
+        <p:cNvPr id="1" name=""/>
+        <p:cNvGrpSpPr/>
+        <p:nvPr/>
+      </p:nvGrpSpPr>
+      <p:grpSpPr>
+        <a:xfrm>
+          <a:off x="0" y="0"/>
+          <a:ext cx="0" cy="0"/>
+          <a:chOff x="0" y="0"/>
+          <a:chExt cx="0" cy="0"/>
+        </a:xfrm>
+      </p:grpSpPr>
+      <p:sp>
+        <p:nvSpPr>
+          <p:cNvPr id="2" name="Title 1">
+            <a:extLst>
+              <a:ext uri="{FF2B5EF4-FFF2-40B4-BE49-F238E27FC236}">
+                <a16:creationId xmlns:a16="http://schemas.microsoft.com/office/drawing/2014/main" id="{974E0BA9-0B2D-E2E6-5AAB-A9ECF0A8CA58}"/>
+              </a:ext>
+            </a:extLst>
+          </p:cNvPr>
+          <p:cNvSpPr>
+            <a:spLocks noGrp="1"/>
+          </p:cNvSpPr>
+          <p:nvPr>
+            <p:ph type="title"/>
+          </p:nvPr>
+        </p:nvSpPr>
+        <p:spPr/>
+        <p:txBody>
+          <a:bodyPr/>
+          <a:lstStyle/>
+          <a:p>
+            <a:r>
+              <a:rPr lang="en-US" dirty="0"/>
+              <a:t>Extensions: Parsing the Response</a:t>
+            </a:r>
+          </a:p>
+        </p:txBody>
+      </p:sp>
+      <p:sp>
+        <p:nvSpPr>
+          <p:cNvPr id="3" name="Content Placeholder 2">
+            <a:extLst>
+              <a:ext uri="{FF2B5EF4-FFF2-40B4-BE49-F238E27FC236}">
+                <a16:creationId xmlns:a16="http://schemas.microsoft.com/office/drawing/2014/main" id="{B8934C0E-EC66-4522-3243-43AA772F1734}"/>
+              </a:ext>
+            </a:extLst>
+          </p:cNvPr>
+          <p:cNvSpPr>
+            <a:spLocks noGrp="1"/>
+          </p:cNvSpPr>
+          <p:nvPr>
+            <p:ph idx="1"/>
+          </p:nvPr>
+        </p:nvSpPr>
+        <p:spPr/>
+        <p:txBody>
+          <a:bodyPr/>
+          <a:lstStyle/>
+          <a:p>
+            <a:r>
+              <a:rPr lang="en-US" dirty="0"/>
+              <a:t>What if it is painful to parse the LLM’s response?</a:t>
+            </a:r>
+          </a:p>
+          <a:p>
+            <a:r>
+              <a:rPr lang="en-US" dirty="0"/>
+              <a:t>Any ideas for what to do?</a:t>
+            </a:r>
+          </a:p>
+        </p:txBody>
+      </p:sp>
+    </p:spTree>
+    <p:extLst>
+      <p:ext uri="{BB962C8B-B14F-4D97-AF65-F5344CB8AC3E}">
+        <p14:creationId xmlns:p14="http://schemas.microsoft.com/office/powerpoint/2010/main" val="3514943817"/>
+      </p:ext>
+    </p:extLst>
+  </p:cSld>
+  <p:clrMapOvr>
+    <a:masterClrMapping/>
+  </p:clrMapOvr>
+</p:sld>
+</file>
+
+<file path=ppt/slides/slide19.xml><?xml version="1.0" encoding="utf-8"?>
+<p:sld xmlns:a="http://schemas.openxmlformats.org/drawingml/2006/main" xmlns:r="http://schemas.openxmlformats.org/officeDocument/2006/relationships" xmlns:p="http://schemas.openxmlformats.org/presentationml/2006/main">
+  <p:cSld>
+    <p:spTree>
+      <p:nvGrpSpPr>
+        <p:cNvPr id="1" name=""/>
+        <p:cNvGrpSpPr/>
+        <p:nvPr/>
+      </p:nvGrpSpPr>
+      <p:grpSpPr>
+        <a:xfrm>
+          <a:off x="0" y="0"/>
+          <a:ext cx="0" cy="0"/>
+          <a:chOff x="0" y="0"/>
+          <a:chExt cx="0" cy="0"/>
+        </a:xfrm>
+      </p:grpSpPr>
+      <p:sp>
+        <p:nvSpPr>
+          <p:cNvPr id="2" name="Title 1">
+            <a:extLst>
+              <a:ext uri="{FF2B5EF4-FFF2-40B4-BE49-F238E27FC236}">
+                <a16:creationId xmlns:a16="http://schemas.microsoft.com/office/drawing/2014/main" id="{149F1303-F8A9-BCE5-6A26-8805F72C66B0}"/>
+              </a:ext>
+            </a:extLst>
+          </p:cNvPr>
+          <p:cNvSpPr>
+            <a:spLocks noGrp="1"/>
+          </p:cNvSpPr>
+          <p:nvPr>
+            <p:ph type="title"/>
+          </p:nvPr>
+        </p:nvSpPr>
+        <p:spPr/>
+        <p:txBody>
+          <a:bodyPr/>
+          <a:lstStyle/>
+          <a:p>
+            <a:r>
+              <a:rPr lang="en-US" dirty="0" err="1"/>
+              <a:t>OpenAI</a:t>
+            </a:r>
+            <a:r>
+              <a:rPr lang="en-US" dirty="0"/>
+              <a:t> API</a:t>
+            </a:r>
+          </a:p>
+        </p:txBody>
+      </p:sp>
+      <p:sp>
+        <p:nvSpPr>
+          <p:cNvPr id="3" name="Content Placeholder 2">
+            <a:extLst>
+              <a:ext uri="{FF2B5EF4-FFF2-40B4-BE49-F238E27FC236}">
+                <a16:creationId xmlns:a16="http://schemas.microsoft.com/office/drawing/2014/main" id="{4C971840-A014-B67C-8448-0E6A96B2C2F6}"/>
+              </a:ext>
+            </a:extLst>
+          </p:cNvPr>
+          <p:cNvSpPr>
+            <a:spLocks noGrp="1"/>
+          </p:cNvSpPr>
+          <p:nvPr>
+            <p:ph idx="1"/>
+          </p:nvPr>
+        </p:nvSpPr>
+        <p:spPr/>
+        <p:txBody>
+          <a:bodyPr>
+            <a:normAutofit/>
+          </a:bodyPr>
+          <a:lstStyle/>
+          <a:p>
+            <a:r>
+              <a:rPr lang="en-US" dirty="0">
+                <a:hlinkClick r:id="rId3"/>
+              </a:rPr>
+              <a:t>https://platform.openai.com/docs/api-reference/chat/create</a:t>
+            </a:r>
+            <a:r>
+              <a:rPr lang="en-US" dirty="0"/>
+              <a:t> </a:t>
+            </a:r>
+          </a:p>
+          <a:p>
+            <a:endParaRPr lang="en-US" dirty="0"/>
+          </a:p>
+          <a:p>
+            <a:r>
+              <a:rPr lang="en-US" dirty="0"/>
+              <a:t>Of course they are pushing the latest version of the model. You won’t need that here.</a:t>
+            </a:r>
+          </a:p>
+          <a:p>
+            <a:endParaRPr lang="en-US" dirty="0"/>
+          </a:p>
+          <a:p>
+            <a:r>
+              <a:rPr lang="en-US" dirty="0"/>
+              <a:t>Other interesting things in the </a:t>
+            </a:r>
+            <a:r>
+              <a:rPr lang="en-US" dirty="0" err="1"/>
+              <a:t>ChatCompletions</a:t>
+            </a:r>
+            <a:r>
+              <a:rPr lang="en-US" dirty="0"/>
+              <a:t> and Responses APIs</a:t>
+            </a:r>
+          </a:p>
+          <a:p>
+            <a:pPr lvl="1"/>
+            <a:r>
+              <a:rPr lang="en-US" dirty="0" err="1"/>
+              <a:t>Websearch</a:t>
+            </a:r>
+            <a:r>
+              <a:rPr lang="en-US" dirty="0"/>
+              <a:t>: a responses tool.</a:t>
+            </a:r>
+          </a:p>
+          <a:p>
+            <a:pPr lvl="1"/>
+            <a:r>
+              <a:rPr lang="en-US" dirty="0"/>
+              <a:t>Image: use as input to the call.</a:t>
+            </a:r>
+          </a:p>
+          <a:p>
+            <a:endParaRPr lang="en-US" dirty="0"/>
+          </a:p>
+          <a:p>
+            <a:endParaRPr lang="en-US" dirty="0"/>
+          </a:p>
+        </p:txBody>
+      </p:sp>
+    </p:spTree>
+    <p:extLst>
+      <p:ext uri="{BB962C8B-B14F-4D97-AF65-F5344CB8AC3E}">
+        <p14:creationId xmlns:p14="http://schemas.microsoft.com/office/powerpoint/2010/main" val="2442557687"/>
       </p:ext>
     </p:extLst>
   </p:cSld>
@@ -5687,6 +5957,111 @@
       <p:bldP spid="9" grpId="0"/>
     </p:bldLst>
   </p:timing>
+</p:sld>
+</file>
+
+<file path=ppt/slides/slide20.xml><?xml version="1.0" encoding="utf-8"?>
+<p:sld xmlns:a="http://schemas.openxmlformats.org/drawingml/2006/main" xmlns:r="http://schemas.openxmlformats.org/officeDocument/2006/relationships" xmlns:p="http://schemas.openxmlformats.org/presentationml/2006/main">
+  <p:cSld>
+    <p:spTree>
+      <p:nvGrpSpPr>
+        <p:cNvPr id="1" name=""/>
+        <p:cNvGrpSpPr/>
+        <p:nvPr/>
+      </p:nvGrpSpPr>
+      <p:grpSpPr>
+        <a:xfrm>
+          <a:off x="0" y="0"/>
+          <a:ext cx="0" cy="0"/>
+          <a:chOff x="0" y="0"/>
+          <a:chExt cx="0" cy="0"/>
+        </a:xfrm>
+      </p:grpSpPr>
+      <p:sp>
+        <p:nvSpPr>
+          <p:cNvPr id="2" name="Title 1">
+            <a:extLst>
+              <a:ext uri="{FF2B5EF4-FFF2-40B4-BE49-F238E27FC236}">
+                <a16:creationId xmlns:a16="http://schemas.microsoft.com/office/drawing/2014/main" id="{974E0BA9-0B2D-E2E6-5AAB-A9ECF0A8CA58}"/>
+              </a:ext>
+            </a:extLst>
+          </p:cNvPr>
+          <p:cNvSpPr>
+            <a:spLocks noGrp="1"/>
+          </p:cNvSpPr>
+          <p:nvPr>
+            <p:ph type="title"/>
+          </p:nvPr>
+        </p:nvSpPr>
+        <p:spPr/>
+        <p:txBody>
+          <a:bodyPr/>
+          <a:lstStyle/>
+          <a:p>
+            <a:r>
+              <a:rPr lang="en-US" dirty="0"/>
+              <a:t>API</a:t>
+            </a:r>
+          </a:p>
+        </p:txBody>
+      </p:sp>
+      <p:sp>
+        <p:nvSpPr>
+          <p:cNvPr id="3" name="Content Placeholder 2">
+            <a:extLst>
+              <a:ext uri="{FF2B5EF4-FFF2-40B4-BE49-F238E27FC236}">
+                <a16:creationId xmlns:a16="http://schemas.microsoft.com/office/drawing/2014/main" id="{B8934C0E-EC66-4522-3243-43AA772F1734}"/>
+              </a:ext>
+            </a:extLst>
+          </p:cNvPr>
+          <p:cNvSpPr>
+            <a:spLocks noGrp="1"/>
+          </p:cNvSpPr>
+          <p:nvPr>
+            <p:ph idx="1"/>
+          </p:nvPr>
+        </p:nvSpPr>
+        <p:spPr/>
+        <p:txBody>
+          <a:bodyPr/>
+          <a:lstStyle/>
+          <a:p>
+            <a:r>
+              <a:rPr lang="en-US" dirty="0" err="1"/>
+              <a:t>Websearch</a:t>
+            </a:r>
+            <a:r>
+              <a:rPr lang="en-US" dirty="0"/>
+              <a:t>: a responses tool.</a:t>
+            </a:r>
+          </a:p>
+          <a:p>
+            <a:r>
+              <a:rPr lang="en-US" dirty="0"/>
+              <a:t>Image: use as input to the call.</a:t>
+            </a:r>
+          </a:p>
+          <a:p>
+            <a:endParaRPr lang="en-US" dirty="0"/>
+          </a:p>
+          <a:p>
+            <a:r>
+              <a:rPr lang="en-US" dirty="0"/>
+              <a:t>Back to the API for hooks.</a:t>
+            </a:r>
+          </a:p>
+        </p:txBody>
+      </p:sp>
+    </p:spTree>
+    <p:extLst>
+      <p:ext uri="{BB962C8B-B14F-4D97-AF65-F5344CB8AC3E}">
+        <p14:creationId xmlns:p14="http://schemas.microsoft.com/office/powerpoint/2010/main" val="60481046"/>
+      </p:ext>
+    </p:extLst>
+  </p:cSld>
+  <p:clrMapOvr>
+    <a:masterClrMapping/>
+  </p:clrMapOvr>
 </p:sld>
 </file>
 

</xml_diff>